<commit_message>
Addition of Sequence Diagrams for birthdays function
</commit_message>
<xml_diff>
--- a/docs/diagrams/UiComponentClassDiagram.pptx
+++ b/docs/diagrams/UiComponentClassDiagram.pptx
@@ -208,7 +208,7 @@
           <a:p>
             <a:fld id="{F5CC4B3F-88C1-4FFA-B1B6-F41C21DC6924}" type="datetimeFigureOut">
               <a:rPr lang="en-US" smtClean="0"/>
-              <a:t>1/7/2017</a:t>
+              <a:t>3/25/2018</a:t>
             </a:fld>
             <a:endParaRPr lang="en-US"/>
           </a:p>
@@ -654,7 +654,7 @@
           <a:p>
             <a:fld id="{78C97017-6FC3-485B-9764-EAC9E56C1D49}" type="datetimeFigureOut">
               <a:rPr lang="en-US" smtClean="0"/>
-              <a:t>1/7/2017</a:t>
+              <a:t>3/25/2018</a:t>
             </a:fld>
             <a:endParaRPr lang="en-US"/>
           </a:p>
@@ -822,7 +822,7 @@
           <a:p>
             <a:fld id="{78C97017-6FC3-485B-9764-EAC9E56C1D49}" type="datetimeFigureOut">
               <a:rPr lang="en-US" smtClean="0"/>
-              <a:t>1/7/2017</a:t>
+              <a:t>3/25/2018</a:t>
             </a:fld>
             <a:endParaRPr lang="en-US"/>
           </a:p>
@@ -1000,7 +1000,7 @@
           <a:p>
             <a:fld id="{78C97017-6FC3-485B-9764-EAC9E56C1D49}" type="datetimeFigureOut">
               <a:rPr lang="en-US" smtClean="0"/>
-              <a:t>1/7/2017</a:t>
+              <a:t>3/25/2018</a:t>
             </a:fld>
             <a:endParaRPr lang="en-US"/>
           </a:p>
@@ -1168,7 +1168,7 @@
           <a:p>
             <a:fld id="{78C97017-6FC3-485B-9764-EAC9E56C1D49}" type="datetimeFigureOut">
               <a:rPr lang="en-US" smtClean="0"/>
-              <a:t>1/7/2017</a:t>
+              <a:t>3/25/2018</a:t>
             </a:fld>
             <a:endParaRPr lang="en-US"/>
           </a:p>
@@ -1413,7 +1413,7 @@
           <a:p>
             <a:fld id="{78C97017-6FC3-485B-9764-EAC9E56C1D49}" type="datetimeFigureOut">
               <a:rPr lang="en-US" smtClean="0"/>
-              <a:t>1/7/2017</a:t>
+              <a:t>3/25/2018</a:t>
             </a:fld>
             <a:endParaRPr lang="en-US"/>
           </a:p>
@@ -1698,7 +1698,7 @@
           <a:p>
             <a:fld id="{78C97017-6FC3-485B-9764-EAC9E56C1D49}" type="datetimeFigureOut">
               <a:rPr lang="en-US" smtClean="0"/>
-              <a:t>1/7/2017</a:t>
+              <a:t>3/25/2018</a:t>
             </a:fld>
             <a:endParaRPr lang="en-US"/>
           </a:p>
@@ -2117,7 +2117,7 @@
           <a:p>
             <a:fld id="{78C97017-6FC3-485B-9764-EAC9E56C1D49}" type="datetimeFigureOut">
               <a:rPr lang="en-US" smtClean="0"/>
-              <a:t>1/7/2017</a:t>
+              <a:t>3/25/2018</a:t>
             </a:fld>
             <a:endParaRPr lang="en-US"/>
           </a:p>
@@ -2234,7 +2234,7 @@
           <a:p>
             <a:fld id="{78C97017-6FC3-485B-9764-EAC9E56C1D49}" type="datetimeFigureOut">
               <a:rPr lang="en-US" smtClean="0"/>
-              <a:t>1/7/2017</a:t>
+              <a:t>3/25/2018</a:t>
             </a:fld>
             <a:endParaRPr lang="en-US"/>
           </a:p>
@@ -2329,7 +2329,7 @@
           <a:p>
             <a:fld id="{78C97017-6FC3-485B-9764-EAC9E56C1D49}" type="datetimeFigureOut">
               <a:rPr lang="en-US" smtClean="0"/>
-              <a:t>1/7/2017</a:t>
+              <a:t>3/25/2018</a:t>
             </a:fld>
             <a:endParaRPr lang="en-US"/>
           </a:p>
@@ -2604,7 +2604,7 @@
           <a:p>
             <a:fld id="{78C97017-6FC3-485B-9764-EAC9E56C1D49}" type="datetimeFigureOut">
               <a:rPr lang="en-US" smtClean="0"/>
-              <a:t>1/7/2017</a:t>
+              <a:t>3/25/2018</a:t>
             </a:fld>
             <a:endParaRPr lang="en-US"/>
           </a:p>
@@ -2856,7 +2856,7 @@
           <a:p>
             <a:fld id="{78C97017-6FC3-485B-9764-EAC9E56C1D49}" type="datetimeFigureOut">
               <a:rPr lang="en-US" smtClean="0"/>
-              <a:t>1/7/2017</a:t>
+              <a:t>3/25/2018</a:t>
             </a:fld>
             <a:endParaRPr lang="en-US"/>
           </a:p>
@@ -3067,7 +3067,7 @@
           <a:p>
             <a:fld id="{78C97017-6FC3-485B-9764-EAC9E56C1D49}" type="datetimeFigureOut">
               <a:rPr lang="en-US" smtClean="0"/>
-              <a:t>1/7/2017</a:t>
+              <a:t>3/25/2018</a:t>
             </a:fld>
             <a:endParaRPr lang="en-US"/>
           </a:p>
@@ -3885,8 +3885,8 @@
         </p:nvSpPr>
         <p:spPr>
           <a:xfrm>
-            <a:off x="2592528" y="3649359"/>
-            <a:ext cx="1093635" cy="236841"/>
+            <a:off x="3974402" y="3485412"/>
+            <a:ext cx="1040400" cy="236841"/>
           </a:xfrm>
           <a:prstGeom prst="rect">
             <a:avLst/>
@@ -4065,7 +4065,7 @@
         </p:nvSpPr>
         <p:spPr>
           <a:xfrm>
-            <a:off x="3839323" y="4228801"/>
+            <a:off x="3962783" y="4217675"/>
             <a:ext cx="1040906" cy="236841"/>
           </a:xfrm>
           <a:prstGeom prst="rect">
@@ -4330,15 +4330,16 @@
         <p:nvCxnSpPr>
           <p:cNvPr id="44" name="Elbow Connector 63"/>
           <p:cNvCxnSpPr>
+            <a:cxnSpLocks/>
             <a:stCxn id="39" idx="2"/>
-            <a:endCxn id="34" idx="1"/>
+            <a:endCxn id="45" idx="1"/>
           </p:cNvCxnSpPr>
           <p:nvPr/>
         </p:nvCxnSpPr>
         <p:spPr>
           <a:xfrm rot="16200000" flipH="1">
-            <a:off x="2054450" y="3229701"/>
-            <a:ext cx="899755" cy="176402"/>
+            <a:off x="2053593" y="3230557"/>
+            <a:ext cx="901464" cy="176399"/>
           </a:xfrm>
           <a:prstGeom prst="bentConnector2">
             <a:avLst/>
@@ -4620,8 +4621,8 @@
         </p:nvCxnSpPr>
         <p:spPr>
           <a:xfrm rot="5400000">
-            <a:off x="4174488" y="2991741"/>
-            <a:ext cx="2061222" cy="649740"/>
+            <a:off x="4241781" y="3047908"/>
+            <a:ext cx="2050096" cy="526280"/>
           </a:xfrm>
           <a:prstGeom prst="bentConnector2">
             <a:avLst/>
@@ -4654,6 +4655,7 @@
         <p:nvCxnSpPr>
           <p:cNvPr id="82" name="Elbow Connector 63"/>
           <p:cNvCxnSpPr>
+            <a:cxnSpLocks/>
             <a:stCxn id="16" idx="3"/>
             <a:endCxn id="34" idx="3"/>
           </p:cNvCxnSpPr>
@@ -4661,8 +4663,8 @@
         </p:nvCxnSpPr>
         <p:spPr>
           <a:xfrm rot="5400000">
-            <a:off x="3867176" y="2104987"/>
-            <a:ext cx="1481780" cy="1843806"/>
+            <a:off x="4613470" y="2687333"/>
+            <a:ext cx="1317833" cy="515167"/>
           </a:xfrm>
           <a:prstGeom prst="bentConnector2">
             <a:avLst/>
@@ -5168,8 +5170,8 @@
         </p:nvCxnSpPr>
         <p:spPr>
           <a:xfrm rot="16200000" flipH="1">
-            <a:off x="3430123" y="3938021"/>
-            <a:ext cx="118421" cy="699979"/>
+            <a:off x="3497416" y="3870728"/>
+            <a:ext cx="107295" cy="823439"/>
           </a:xfrm>
           <a:prstGeom prst="bentConnector2">
             <a:avLst/>
@@ -5509,6 +5511,332 @@
           </a:p>
         </p:txBody>
       </p:sp>
+      <p:sp>
+        <p:nvSpPr>
+          <p:cNvPr id="45" name="Rectangle 11">
+            <a:extLst>
+              <a:ext uri="{FF2B5EF4-FFF2-40B4-BE49-F238E27FC236}">
+                <a16:creationId xmlns:a16="http://schemas.microsoft.com/office/drawing/2014/main" id="{50ECE6AA-BF83-469B-AE5B-225A6A375CB4}"/>
+              </a:ext>
+            </a:extLst>
+          </p:cNvPr>
+          <p:cNvSpPr/>
+          <p:nvPr/>
+        </p:nvSpPr>
+        <p:spPr>
+          <a:xfrm>
+            <a:off x="2592525" y="3651068"/>
+            <a:ext cx="1093635" cy="236841"/>
+          </a:xfrm>
+          <a:prstGeom prst="rect">
+            <a:avLst/>
+          </a:prstGeom>
+          <a:ln w="19050">
+            <a:solidFill>
+              <a:schemeClr val="accent3"/>
+            </a:solidFill>
+          </a:ln>
+          <a:effectLst/>
+        </p:spPr>
+        <p:style>
+          <a:lnRef idx="1">
+            <a:schemeClr val="accent3"/>
+          </a:lnRef>
+          <a:fillRef idx="2">
+            <a:schemeClr val="accent3"/>
+          </a:fillRef>
+          <a:effectRef idx="1">
+            <a:schemeClr val="accent3"/>
+          </a:effectRef>
+          <a:fontRef idx="minor">
+            <a:schemeClr val="dk1"/>
+          </a:fontRef>
+        </p:style>
+        <p:txBody>
+          <a:bodyPr rtlCol="0" anchor="ctr"/>
+          <a:lstStyle/>
+          <a:p>
+            <a:pPr algn="ctr"/>
+            <a:r>
+              <a:rPr lang="en-US" sz="1050" b="1" dirty="0" err="1">
+                <a:solidFill>
+                  <a:schemeClr val="accent3">
+                    <a:lumMod val="75000"/>
+                  </a:schemeClr>
+                </a:solidFill>
+              </a:rPr>
+              <a:t>InfoPanel</a:t>
+            </a:r>
+            <a:endParaRPr lang="en-SG" sz="1050" b="1" dirty="0">
+              <a:solidFill>
+                <a:schemeClr val="accent3">
+                  <a:lumMod val="75000"/>
+                </a:schemeClr>
+              </a:solidFill>
+            </a:endParaRPr>
+          </a:p>
+        </p:txBody>
+      </p:sp>
+      <p:cxnSp>
+        <p:nvCxnSpPr>
+          <p:cNvPr id="48" name="Elbow Connector 63">
+            <a:extLst>
+              <a:ext uri="{FF2B5EF4-FFF2-40B4-BE49-F238E27FC236}">
+                <a16:creationId xmlns:a16="http://schemas.microsoft.com/office/drawing/2014/main" id="{A4525834-5246-4F67-8B26-73ACEA221F26}"/>
+              </a:ext>
+            </a:extLst>
+          </p:cNvPr>
+          <p:cNvCxnSpPr>
+            <a:cxnSpLocks/>
+            <a:stCxn id="45" idx="3"/>
+            <a:endCxn id="34" idx="1"/>
+          </p:cNvCxnSpPr>
+          <p:nvPr/>
+        </p:nvCxnSpPr>
+        <p:spPr>
+          <a:xfrm flipV="1">
+            <a:off x="3686160" y="3603833"/>
+            <a:ext cx="288242" cy="165656"/>
+          </a:xfrm>
+          <a:prstGeom prst="bentConnector3">
+            <a:avLst>
+              <a:gd name="adj1" fmla="val 50000"/>
+            </a:avLst>
+          </a:prstGeom>
+          <a:ln w="19050">
+            <a:solidFill>
+              <a:schemeClr val="accent3"/>
+            </a:solidFill>
+            <a:headEnd type="none" w="med" len="med"/>
+            <a:tailEnd type="arrow" w="med" len="med"/>
+          </a:ln>
+          <a:effectLst/>
+        </p:spPr>
+        <p:style>
+          <a:lnRef idx="1">
+            <a:schemeClr val="accent2"/>
+          </a:lnRef>
+          <a:fillRef idx="2">
+            <a:schemeClr val="accent2"/>
+          </a:fillRef>
+          <a:effectRef idx="1">
+            <a:schemeClr val="accent2"/>
+          </a:effectRef>
+          <a:fontRef idx="minor">
+            <a:schemeClr val="dk1"/>
+          </a:fontRef>
+        </p:style>
+      </p:cxnSp>
+      <p:cxnSp>
+        <p:nvCxnSpPr>
+          <p:cNvPr id="52" name="Elbow Connector 63">
+            <a:extLst>
+              <a:ext uri="{FF2B5EF4-FFF2-40B4-BE49-F238E27FC236}">
+                <a16:creationId xmlns:a16="http://schemas.microsoft.com/office/drawing/2014/main" id="{F1918F0C-9020-408E-B183-73073A05F3D2}"/>
+              </a:ext>
+            </a:extLst>
+          </p:cNvPr>
+          <p:cNvCxnSpPr>
+            <a:cxnSpLocks/>
+            <a:stCxn id="16" idx="3"/>
+          </p:cNvCxnSpPr>
+          <p:nvPr/>
+        </p:nvCxnSpPr>
+        <p:spPr>
+          <a:xfrm rot="5400000">
+            <a:off x="3868899" y="2123986"/>
+            <a:ext cx="1499056" cy="1823084"/>
+          </a:xfrm>
+          <a:prstGeom prst="bentConnector2">
+            <a:avLst/>
+          </a:prstGeom>
+          <a:ln w="6350">
+            <a:solidFill>
+              <a:schemeClr val="accent3"/>
+            </a:solidFill>
+            <a:headEnd type="none" w="med" len="med"/>
+            <a:tailEnd type="none" w="med" len="med"/>
+          </a:ln>
+          <a:effectLst/>
+        </p:spPr>
+        <p:style>
+          <a:lnRef idx="1">
+            <a:schemeClr val="accent2"/>
+          </a:lnRef>
+          <a:fillRef idx="2">
+            <a:schemeClr val="accent2"/>
+          </a:fillRef>
+          <a:effectRef idx="1">
+            <a:schemeClr val="accent2"/>
+          </a:effectRef>
+          <a:fontRef idx="minor">
+            <a:schemeClr val="dk1"/>
+          </a:fontRef>
+        </p:style>
+      </p:cxnSp>
+      <p:sp>
+        <p:nvSpPr>
+          <p:cNvPr id="55" name="Rectangle 11">
+            <a:extLst>
+              <a:ext uri="{FF2B5EF4-FFF2-40B4-BE49-F238E27FC236}">
+                <a16:creationId xmlns:a16="http://schemas.microsoft.com/office/drawing/2014/main" id="{EF3C6991-2DEC-4F99-A3A9-F1121B2D240A}"/>
+              </a:ext>
+            </a:extLst>
+          </p:cNvPr>
+          <p:cNvSpPr/>
+          <p:nvPr/>
+        </p:nvSpPr>
+        <p:spPr>
+          <a:xfrm>
+            <a:off x="3962783" y="3836885"/>
+            <a:ext cx="1040400" cy="236841"/>
+          </a:xfrm>
+          <a:prstGeom prst="rect">
+            <a:avLst/>
+          </a:prstGeom>
+          <a:ln w="19050">
+            <a:solidFill>
+              <a:schemeClr val="accent3"/>
+            </a:solidFill>
+          </a:ln>
+          <a:effectLst/>
+        </p:spPr>
+        <p:style>
+          <a:lnRef idx="1">
+            <a:schemeClr val="accent3"/>
+          </a:lnRef>
+          <a:fillRef idx="2">
+            <a:schemeClr val="accent3"/>
+          </a:fillRef>
+          <a:effectRef idx="1">
+            <a:schemeClr val="accent3"/>
+          </a:effectRef>
+          <a:fontRef idx="minor">
+            <a:schemeClr val="dk1"/>
+          </a:fontRef>
+        </p:style>
+        <p:txBody>
+          <a:bodyPr rtlCol="0" anchor="ctr"/>
+          <a:lstStyle/>
+          <a:p>
+            <a:pPr algn="ctr"/>
+            <a:r>
+              <a:rPr lang="en-US" sz="1050" b="1" dirty="0" err="1">
+                <a:solidFill>
+                  <a:schemeClr val="accent3">
+                    <a:lumMod val="75000"/>
+                  </a:schemeClr>
+                </a:solidFill>
+              </a:rPr>
+              <a:t>BirthdayList</a:t>
+            </a:r>
+            <a:endParaRPr lang="en-SG" sz="1050" b="1" dirty="0">
+              <a:solidFill>
+                <a:schemeClr val="accent3">
+                  <a:lumMod val="75000"/>
+                </a:schemeClr>
+              </a:solidFill>
+            </a:endParaRPr>
+          </a:p>
+        </p:txBody>
+      </p:sp>
+      <p:cxnSp>
+        <p:nvCxnSpPr>
+          <p:cNvPr id="58" name="Elbow Connector 63">
+            <a:extLst>
+              <a:ext uri="{FF2B5EF4-FFF2-40B4-BE49-F238E27FC236}">
+                <a16:creationId xmlns:a16="http://schemas.microsoft.com/office/drawing/2014/main" id="{9E318F79-EA9F-43F7-9754-4E287E7663D0}"/>
+              </a:ext>
+            </a:extLst>
+          </p:cNvPr>
+          <p:cNvCxnSpPr>
+            <a:cxnSpLocks/>
+            <a:endCxn id="55" idx="3"/>
+          </p:cNvCxnSpPr>
+          <p:nvPr/>
+        </p:nvCxnSpPr>
+        <p:spPr>
+          <a:xfrm rot="5400000">
+            <a:off x="4452405" y="2869933"/>
+            <a:ext cx="1636151" cy="534594"/>
+          </a:xfrm>
+          <a:prstGeom prst="bentConnector2">
+            <a:avLst/>
+          </a:prstGeom>
+          <a:ln w="6350">
+            <a:solidFill>
+              <a:schemeClr val="accent3"/>
+            </a:solidFill>
+            <a:headEnd type="none" w="med" len="med"/>
+            <a:tailEnd type="none" w="med" len="med"/>
+          </a:ln>
+          <a:effectLst/>
+        </p:spPr>
+        <p:style>
+          <a:lnRef idx="1">
+            <a:schemeClr val="accent2"/>
+          </a:lnRef>
+          <a:fillRef idx="2">
+            <a:schemeClr val="accent2"/>
+          </a:fillRef>
+          <a:effectRef idx="1">
+            <a:schemeClr val="accent2"/>
+          </a:effectRef>
+          <a:fontRef idx="minor">
+            <a:schemeClr val="dk1"/>
+          </a:fontRef>
+        </p:style>
+      </p:cxnSp>
+      <p:cxnSp>
+        <p:nvCxnSpPr>
+          <p:cNvPr id="63" name="Elbow Connector 63">
+            <a:extLst>
+              <a:ext uri="{FF2B5EF4-FFF2-40B4-BE49-F238E27FC236}">
+                <a16:creationId xmlns:a16="http://schemas.microsoft.com/office/drawing/2014/main" id="{3DAE4C40-D984-4A46-A10D-31EC7B0AD5F3}"/>
+              </a:ext>
+            </a:extLst>
+          </p:cNvPr>
+          <p:cNvCxnSpPr>
+            <a:cxnSpLocks/>
+            <a:stCxn id="45" idx="3"/>
+            <a:endCxn id="55" idx="1"/>
+          </p:cNvCxnSpPr>
+          <p:nvPr/>
+        </p:nvCxnSpPr>
+        <p:spPr>
+          <a:xfrm>
+            <a:off x="3686160" y="3769489"/>
+            <a:ext cx="276623" cy="185817"/>
+          </a:xfrm>
+          <a:prstGeom prst="bentConnector3">
+            <a:avLst>
+              <a:gd name="adj1" fmla="val 50000"/>
+            </a:avLst>
+          </a:prstGeom>
+          <a:ln w="19050">
+            <a:solidFill>
+              <a:schemeClr val="accent3"/>
+            </a:solidFill>
+            <a:headEnd type="none" w="med" len="med"/>
+            <a:tailEnd type="arrow" w="med" len="med"/>
+          </a:ln>
+          <a:effectLst/>
+        </p:spPr>
+        <p:style>
+          <a:lnRef idx="1">
+            <a:schemeClr val="accent2"/>
+          </a:lnRef>
+          <a:fillRef idx="2">
+            <a:schemeClr val="accent2"/>
+          </a:fillRef>
+          <a:effectRef idx="1">
+            <a:schemeClr val="accent2"/>
+          </a:effectRef>
+          <a:fontRef idx="minor">
+            <a:schemeClr val="dk1"/>
+          </a:fontRef>
+        </p:style>
+      </p:cxnSp>
     </p:spTree>
     <p:extLst>
       <p:ext uri="{BB962C8B-B14F-4D97-AF65-F5344CB8AC3E}">

</xml_diff>

<commit_message>
Modify the DevGuide: Section 2.2, Appendix B, Appendix C, AppendixD, Appendix H + Readme.adoc
</commit_message>
<xml_diff>
--- a/docs/diagrams/UiComponentClassDiagram.pptx
+++ b/docs/diagrams/UiComponentClassDiagram.pptx
@@ -208,7 +208,7 @@
           <a:p>
             <a:fld id="{F5CC4B3F-88C1-4FFA-B1B6-F41C21DC6924}" type="datetimeFigureOut">
               <a:rPr lang="en-US" smtClean="0"/>
-              <a:t>1/7/2017</a:t>
+              <a:t>4/15/18</a:t>
             </a:fld>
             <a:endParaRPr lang="en-US"/>
           </a:p>
@@ -654,7 +654,7 @@
           <a:p>
             <a:fld id="{78C97017-6FC3-485B-9764-EAC9E56C1D49}" type="datetimeFigureOut">
               <a:rPr lang="en-US" smtClean="0"/>
-              <a:t>1/7/2017</a:t>
+              <a:t>4/15/18</a:t>
             </a:fld>
             <a:endParaRPr lang="en-US"/>
           </a:p>
@@ -822,7 +822,7 @@
           <a:p>
             <a:fld id="{78C97017-6FC3-485B-9764-EAC9E56C1D49}" type="datetimeFigureOut">
               <a:rPr lang="en-US" smtClean="0"/>
-              <a:t>1/7/2017</a:t>
+              <a:t>4/15/18</a:t>
             </a:fld>
             <a:endParaRPr lang="en-US"/>
           </a:p>
@@ -1000,7 +1000,7 @@
           <a:p>
             <a:fld id="{78C97017-6FC3-485B-9764-EAC9E56C1D49}" type="datetimeFigureOut">
               <a:rPr lang="en-US" smtClean="0"/>
-              <a:t>1/7/2017</a:t>
+              <a:t>4/15/18</a:t>
             </a:fld>
             <a:endParaRPr lang="en-US"/>
           </a:p>
@@ -1168,7 +1168,7 @@
           <a:p>
             <a:fld id="{78C97017-6FC3-485B-9764-EAC9E56C1D49}" type="datetimeFigureOut">
               <a:rPr lang="en-US" smtClean="0"/>
-              <a:t>1/7/2017</a:t>
+              <a:t>4/15/18</a:t>
             </a:fld>
             <a:endParaRPr lang="en-US"/>
           </a:p>
@@ -1413,7 +1413,7 @@
           <a:p>
             <a:fld id="{78C97017-6FC3-485B-9764-EAC9E56C1D49}" type="datetimeFigureOut">
               <a:rPr lang="en-US" smtClean="0"/>
-              <a:t>1/7/2017</a:t>
+              <a:t>4/15/18</a:t>
             </a:fld>
             <a:endParaRPr lang="en-US"/>
           </a:p>
@@ -1698,7 +1698,7 @@
           <a:p>
             <a:fld id="{78C97017-6FC3-485B-9764-EAC9E56C1D49}" type="datetimeFigureOut">
               <a:rPr lang="en-US" smtClean="0"/>
-              <a:t>1/7/2017</a:t>
+              <a:t>4/15/18</a:t>
             </a:fld>
             <a:endParaRPr lang="en-US"/>
           </a:p>
@@ -2117,7 +2117,7 @@
           <a:p>
             <a:fld id="{78C97017-6FC3-485B-9764-EAC9E56C1D49}" type="datetimeFigureOut">
               <a:rPr lang="en-US" smtClean="0"/>
-              <a:t>1/7/2017</a:t>
+              <a:t>4/15/18</a:t>
             </a:fld>
             <a:endParaRPr lang="en-US"/>
           </a:p>
@@ -2234,7 +2234,7 @@
           <a:p>
             <a:fld id="{78C97017-6FC3-485B-9764-EAC9E56C1D49}" type="datetimeFigureOut">
               <a:rPr lang="en-US" smtClean="0"/>
-              <a:t>1/7/2017</a:t>
+              <a:t>4/15/18</a:t>
             </a:fld>
             <a:endParaRPr lang="en-US"/>
           </a:p>
@@ -2329,7 +2329,7 @@
           <a:p>
             <a:fld id="{78C97017-6FC3-485B-9764-EAC9E56C1D49}" type="datetimeFigureOut">
               <a:rPr lang="en-US" smtClean="0"/>
-              <a:t>1/7/2017</a:t>
+              <a:t>4/15/18</a:t>
             </a:fld>
             <a:endParaRPr lang="en-US"/>
           </a:p>
@@ -2604,7 +2604,7 @@
           <a:p>
             <a:fld id="{78C97017-6FC3-485B-9764-EAC9E56C1D49}" type="datetimeFigureOut">
               <a:rPr lang="en-US" smtClean="0"/>
-              <a:t>1/7/2017</a:t>
+              <a:t>4/15/18</a:t>
             </a:fld>
             <a:endParaRPr lang="en-US"/>
           </a:p>
@@ -2856,7 +2856,7 @@
           <a:p>
             <a:fld id="{78C97017-6FC3-485B-9764-EAC9E56C1D49}" type="datetimeFigureOut">
               <a:rPr lang="en-US" smtClean="0"/>
-              <a:t>1/7/2017</a:t>
+              <a:t>4/15/18</a:t>
             </a:fld>
             <a:endParaRPr lang="en-US"/>
           </a:p>
@@ -3067,7 +3067,7 @@
           <a:p>
             <a:fld id="{78C97017-6FC3-485B-9764-EAC9E56C1D49}" type="datetimeFigureOut">
               <a:rPr lang="en-US" smtClean="0"/>
-              <a:t>1/7/2017</a:t>
+              <a:t>4/15/18</a:t>
             </a:fld>
             <a:endParaRPr lang="en-US"/>
           </a:p>
@@ -4038,14 +4038,24 @@
           <a:p>
             <a:pPr algn="ctr"/>
             <a:r>
-              <a:rPr lang="en-US" sz="1050" b="1" dirty="0" err="1">
+              <a:rPr lang="en-US" sz="1050" b="1" dirty="0" err="1" smtClean="0">
                 <a:solidFill>
                   <a:schemeClr val="accent3">
                     <a:lumMod val="75000"/>
                   </a:schemeClr>
                 </a:solidFill>
               </a:rPr>
-              <a:t>PersonListPanel</a:t>
+              <a:t>Book</a:t>
+            </a:r>
+            <a:r>
+              <a:rPr lang="en-US" sz="1050" b="1" dirty="0" err="1" smtClean="0">
+                <a:solidFill>
+                  <a:schemeClr val="accent3">
+                    <a:lumMod val="75000"/>
+                  </a:schemeClr>
+                </a:solidFill>
+              </a:rPr>
+              <a:t>ListPanel</a:t>
             </a:r>
             <a:endParaRPr lang="en-SG" sz="1050" b="1" dirty="0">
               <a:solidFill>
@@ -4098,14 +4108,24 @@
           <a:p>
             <a:pPr algn="ctr"/>
             <a:r>
-              <a:rPr lang="en-US" sz="1050" b="1" dirty="0" err="1">
+              <a:rPr lang="en-US" sz="1050" b="1" smtClean="0">
                 <a:solidFill>
                   <a:schemeClr val="accent3">
                     <a:lumMod val="75000"/>
                   </a:schemeClr>
                 </a:solidFill>
               </a:rPr>
-              <a:t>PersonCard</a:t>
+              <a:t>Book</a:t>
+            </a:r>
+            <a:r>
+              <a:rPr lang="en-US" sz="1050" b="1" smtClean="0">
+                <a:solidFill>
+                  <a:schemeClr val="accent3">
+                    <a:lumMod val="75000"/>
+                  </a:schemeClr>
+                </a:solidFill>
+              </a:rPr>
+              <a:t>Card</a:t>
             </a:r>
             <a:endParaRPr lang="en-SG" sz="1050" b="1" dirty="0">
               <a:solidFill>

</xml_diff>

<commit_message>
update dg and portfolio
</commit_message>
<xml_diff>
--- a/docs/diagrams/UiComponentClassDiagram.pptx
+++ b/docs/diagrams/UiComponentClassDiagram.pptx
@@ -208,7 +208,7 @@
           <a:p>
             <a:fld id="{F5CC4B3F-88C1-4FFA-B1B6-F41C21DC6924}" type="datetimeFigureOut">
               <a:rPr lang="en-US" smtClean="0"/>
-              <a:t>4/4/2018</a:t>
+              <a:t>4/15/2018</a:t>
             </a:fld>
             <a:endParaRPr lang="en-US"/>
           </a:p>
@@ -654,7 +654,7 @@
           <a:p>
             <a:fld id="{78C97017-6FC3-485B-9764-EAC9E56C1D49}" type="datetimeFigureOut">
               <a:rPr lang="en-US" smtClean="0"/>
-              <a:t>4/4/2018</a:t>
+              <a:t>4/15/2018</a:t>
             </a:fld>
             <a:endParaRPr lang="en-US"/>
           </a:p>
@@ -822,7 +822,7 @@
           <a:p>
             <a:fld id="{78C97017-6FC3-485B-9764-EAC9E56C1D49}" type="datetimeFigureOut">
               <a:rPr lang="en-US" smtClean="0"/>
-              <a:t>4/4/2018</a:t>
+              <a:t>4/15/2018</a:t>
             </a:fld>
             <a:endParaRPr lang="en-US"/>
           </a:p>
@@ -1000,7 +1000,7 @@
           <a:p>
             <a:fld id="{78C97017-6FC3-485B-9764-EAC9E56C1D49}" type="datetimeFigureOut">
               <a:rPr lang="en-US" smtClean="0"/>
-              <a:t>4/4/2018</a:t>
+              <a:t>4/15/2018</a:t>
             </a:fld>
             <a:endParaRPr lang="en-US"/>
           </a:p>
@@ -1168,7 +1168,7 @@
           <a:p>
             <a:fld id="{78C97017-6FC3-485B-9764-EAC9E56C1D49}" type="datetimeFigureOut">
               <a:rPr lang="en-US" smtClean="0"/>
-              <a:t>4/4/2018</a:t>
+              <a:t>4/15/2018</a:t>
             </a:fld>
             <a:endParaRPr lang="en-US"/>
           </a:p>
@@ -1413,7 +1413,7 @@
           <a:p>
             <a:fld id="{78C97017-6FC3-485B-9764-EAC9E56C1D49}" type="datetimeFigureOut">
               <a:rPr lang="en-US" smtClean="0"/>
-              <a:t>4/4/2018</a:t>
+              <a:t>4/15/2018</a:t>
             </a:fld>
             <a:endParaRPr lang="en-US"/>
           </a:p>
@@ -1698,7 +1698,7 @@
           <a:p>
             <a:fld id="{78C97017-6FC3-485B-9764-EAC9E56C1D49}" type="datetimeFigureOut">
               <a:rPr lang="en-US" smtClean="0"/>
-              <a:t>4/4/2018</a:t>
+              <a:t>4/15/2018</a:t>
             </a:fld>
             <a:endParaRPr lang="en-US"/>
           </a:p>
@@ -2117,7 +2117,7 @@
           <a:p>
             <a:fld id="{78C97017-6FC3-485B-9764-EAC9E56C1D49}" type="datetimeFigureOut">
               <a:rPr lang="en-US" smtClean="0"/>
-              <a:t>4/4/2018</a:t>
+              <a:t>4/15/2018</a:t>
             </a:fld>
             <a:endParaRPr lang="en-US"/>
           </a:p>
@@ -2234,7 +2234,7 @@
           <a:p>
             <a:fld id="{78C97017-6FC3-485B-9764-EAC9E56C1D49}" type="datetimeFigureOut">
               <a:rPr lang="en-US" smtClean="0"/>
-              <a:t>4/4/2018</a:t>
+              <a:t>4/15/2018</a:t>
             </a:fld>
             <a:endParaRPr lang="en-US"/>
           </a:p>
@@ -2329,7 +2329,7 @@
           <a:p>
             <a:fld id="{78C97017-6FC3-485B-9764-EAC9E56C1D49}" type="datetimeFigureOut">
               <a:rPr lang="en-US" smtClean="0"/>
-              <a:t>4/4/2018</a:t>
+              <a:t>4/15/2018</a:t>
             </a:fld>
             <a:endParaRPr lang="en-US"/>
           </a:p>
@@ -2604,7 +2604,7 @@
           <a:p>
             <a:fld id="{78C97017-6FC3-485B-9764-EAC9E56C1D49}" type="datetimeFigureOut">
               <a:rPr lang="en-US" smtClean="0"/>
-              <a:t>4/4/2018</a:t>
+              <a:t>4/15/2018</a:t>
             </a:fld>
             <a:endParaRPr lang="en-US"/>
           </a:p>
@@ -2856,7 +2856,7 @@
           <a:p>
             <a:fld id="{78C97017-6FC3-485B-9764-EAC9E56C1D49}" type="datetimeFigureOut">
               <a:rPr lang="en-US" smtClean="0"/>
-              <a:t>4/4/2018</a:t>
+              <a:t>4/15/2018</a:t>
             </a:fld>
             <a:endParaRPr lang="en-US"/>
           </a:p>
@@ -3067,7 +3067,7 @@
           <a:p>
             <a:fld id="{78C97017-6FC3-485B-9764-EAC9E56C1D49}" type="datetimeFigureOut">
               <a:rPr lang="en-US" smtClean="0"/>
-              <a:t>4/4/2018</a:t>
+              <a:t>4/15/2018</a:t>
             </a:fld>
             <a:endParaRPr lang="en-US"/>
           </a:p>
@@ -3885,7 +3885,7 @@
         </p:nvSpPr>
         <p:spPr>
           <a:xfrm>
-            <a:off x="2592528" y="3582887"/>
+            <a:off x="3514431" y="3845534"/>
             <a:ext cx="1093635" cy="236841"/>
           </a:xfrm>
           <a:prstGeom prst="rect">
@@ -3945,7 +3945,7 @@
         </p:nvSpPr>
         <p:spPr>
           <a:xfrm>
-            <a:off x="2592527" y="4648200"/>
+            <a:off x="2582371" y="3573159"/>
             <a:ext cx="1093635" cy="236841"/>
           </a:xfrm>
           <a:prstGeom prst="rect">
@@ -4005,7 +4005,7 @@
         </p:nvSpPr>
         <p:spPr>
           <a:xfrm>
-            <a:off x="2592526" y="3920177"/>
+            <a:off x="3515107" y="4449748"/>
             <a:ext cx="1093635" cy="236841"/>
           </a:xfrm>
           <a:prstGeom prst="rect">
@@ -4065,7 +4065,7 @@
         </p:nvSpPr>
         <p:spPr>
           <a:xfrm>
-            <a:off x="2592528" y="4966000"/>
+            <a:off x="2593880" y="5073528"/>
             <a:ext cx="1093635" cy="236841"/>
           </a:xfrm>
           <a:prstGeom prst="rect">
@@ -4271,17 +4271,20 @@
           <p:cNvPr id="44" name="Elbow Connector 63"/>
           <p:cNvCxnSpPr>
             <a:stCxn id="39" idx="2"/>
-            <a:endCxn id="34" idx="1"/>
+            <a:endCxn id="60" idx="1"/>
           </p:cNvCxnSpPr>
           <p:nvPr/>
         </p:nvCxnSpPr>
         <p:spPr>
-          <a:xfrm rot="16200000" flipH="1">
-            <a:off x="2087686" y="3196465"/>
-            <a:ext cx="833283" cy="176402"/>
-          </a:xfrm>
-          <a:prstGeom prst="bentConnector2">
-            <a:avLst/>
+          <a:xfrm rot="5400000">
+            <a:off x="1401895" y="3427016"/>
+            <a:ext cx="1573222" cy="455240"/>
+          </a:xfrm>
+          <a:prstGeom prst="bentConnector4">
+            <a:avLst>
+              <a:gd name="adj1" fmla="val 46236"/>
+              <a:gd name="adj2" fmla="val 150215"/>
+            </a:avLst>
           </a:prstGeom>
           <a:ln w="19050">
             <a:solidFill>
@@ -4311,18 +4314,20 @@
         <p:nvCxnSpPr>
           <p:cNvPr id="47" name="Elbow Connector 63"/>
           <p:cNvCxnSpPr>
-            <a:stCxn id="39" idx="2"/>
+            <a:stCxn id="60" idx="3"/>
             <a:endCxn id="36" idx="1"/>
           </p:cNvCxnSpPr>
           <p:nvPr/>
         </p:nvCxnSpPr>
         <p:spPr>
-          <a:xfrm rot="16200000" flipH="1">
-            <a:off x="1919040" y="3365111"/>
-            <a:ext cx="1170573" cy="176400"/>
-          </a:xfrm>
-          <a:prstGeom prst="bentConnector2">
-            <a:avLst/>
+          <a:xfrm>
+            <a:off x="3054521" y="4441247"/>
+            <a:ext cx="460586" cy="126922"/>
+          </a:xfrm>
+          <a:prstGeom prst="bentConnector3">
+            <a:avLst>
+              <a:gd name="adj1" fmla="val 50000"/>
+            </a:avLst>
           </a:prstGeom>
           <a:ln w="19050">
             <a:solidFill>
@@ -4352,18 +4357,20 @@
         <p:nvCxnSpPr>
           <p:cNvPr id="50" name="Elbow Connector 63"/>
           <p:cNvCxnSpPr>
-            <a:stCxn id="39" idx="2"/>
+            <a:stCxn id="60" idx="3"/>
             <a:endCxn id="46" idx="1"/>
           </p:cNvCxnSpPr>
           <p:nvPr/>
         </p:nvCxnSpPr>
         <p:spPr>
-          <a:xfrm rot="16200000" flipH="1">
-            <a:off x="1734931" y="3549219"/>
-            <a:ext cx="1537063" cy="174673"/>
-          </a:xfrm>
-          <a:prstGeom prst="bentConnector2">
-            <a:avLst/>
+          <a:xfrm>
+            <a:off x="3054521" y="4441247"/>
+            <a:ext cx="478534" cy="422024"/>
+          </a:xfrm>
+          <a:prstGeom prst="bentConnector3">
+            <a:avLst>
+              <a:gd name="adj1" fmla="val 50000"/>
+            </a:avLst>
           </a:prstGeom>
           <a:ln w="19050">
             <a:solidFill>
@@ -4399,8 +4406,8 @@
         </p:nvCxnSpPr>
         <p:spPr>
           <a:xfrm rot="16200000" flipH="1">
-            <a:off x="1184119" y="3676012"/>
-            <a:ext cx="2396440" cy="420377"/>
+            <a:off x="1204459" y="3802527"/>
+            <a:ext cx="2485495" cy="293347"/>
           </a:xfrm>
           <a:prstGeom prst="bentConnector2">
             <a:avLst/>
@@ -4559,12 +4566,15 @@
           <p:nvPr/>
         </p:nvCxnSpPr>
         <p:spPr>
-          <a:xfrm rot="5400000">
-            <a:off x="4511627" y="3210270"/>
-            <a:ext cx="1942613" cy="94073"/>
-          </a:xfrm>
-          <a:prstGeom prst="bentConnector2">
-            <a:avLst/>
+          <a:xfrm rot="16200000" flipH="1">
+            <a:off x="4803137" y="3012831"/>
+            <a:ext cx="1927081" cy="473417"/>
+          </a:xfrm>
+          <a:prstGeom prst="bentConnector4">
+            <a:avLst>
+              <a:gd name="adj1" fmla="val 46927"/>
+              <a:gd name="adj2" fmla="val 148287"/>
+            </a:avLst>
           </a:prstGeom>
           <a:ln w="6350">
             <a:solidFill>
@@ -4601,8 +4611,8 @@
         </p:nvCxnSpPr>
         <p:spPr>
           <a:xfrm rot="5400000">
-            <a:off x="3900412" y="2071751"/>
-            <a:ext cx="1415308" cy="1843806"/>
+            <a:off x="4230041" y="2664026"/>
+            <a:ext cx="1677955" cy="921903"/>
           </a:xfrm>
           <a:prstGeom prst="bentConnector2">
             <a:avLst/>
@@ -4683,8 +4693,8 @@
         </p:nvCxnSpPr>
         <p:spPr>
           <a:xfrm rot="5400000">
-            <a:off x="3367756" y="2604407"/>
-            <a:ext cx="2480621" cy="1843807"/>
+            <a:off x="3900198" y="2061809"/>
+            <a:ext cx="1405580" cy="1853963"/>
           </a:xfrm>
           <a:prstGeom prst="bentConnector2">
             <a:avLst/>
@@ -4724,8 +4734,8 @@
         </p:nvCxnSpPr>
         <p:spPr>
           <a:xfrm rot="5400000">
-            <a:off x="3208856" y="2763307"/>
-            <a:ext cx="2798421" cy="1843806"/>
+            <a:off x="3155768" y="2817747"/>
+            <a:ext cx="2905949" cy="1842454"/>
           </a:xfrm>
           <a:prstGeom prst="bentConnector2">
             <a:avLst/>
@@ -5107,9 +5117,9 @@
           <p:nvPr/>
         </p:nvCxnSpPr>
         <p:spPr>
-          <a:xfrm>
-            <a:off x="3686161" y="4038598"/>
-            <a:ext cx="708829" cy="190015"/>
+          <a:xfrm flipV="1">
+            <a:off x="4608742" y="4213081"/>
+            <a:ext cx="353738" cy="355088"/>
           </a:xfrm>
           <a:prstGeom prst="bentConnector3">
             <a:avLst>
@@ -5151,8 +5161,8 @@
         </p:nvCxnSpPr>
         <p:spPr>
           <a:xfrm rot="5400000">
-            <a:off x="3731766" y="2240395"/>
-            <a:ext cx="1752598" cy="1843808"/>
+            <a:off x="3928272" y="2966471"/>
+            <a:ext cx="2282169" cy="921227"/>
           </a:xfrm>
           <a:prstGeom prst="bentConnector2">
             <a:avLst/>
@@ -5459,7 +5469,7 @@
         </p:nvSpPr>
         <p:spPr>
           <a:xfrm>
-            <a:off x="2590799" y="4286667"/>
+            <a:off x="3533055" y="4744850"/>
             <a:ext cx="1093635" cy="236841"/>
           </a:xfrm>
           <a:prstGeom prst="rect">
@@ -5514,13 +5524,15 @@
       <p:cxnSp>
         <p:nvCxnSpPr>
           <p:cNvPr id="54" name="Elbow Connector 63"/>
-          <p:cNvCxnSpPr/>
+          <p:cNvCxnSpPr>
+            <a:endCxn id="35" idx="1"/>
+          </p:cNvCxnSpPr>
           <p:nvPr/>
         </p:nvCxnSpPr>
         <p:spPr>
           <a:xfrm rot="16200000" flipH="1">
-            <a:off x="1710205" y="3888423"/>
-            <a:ext cx="1581724" cy="174673"/>
+            <a:off x="2244709" y="3353918"/>
+            <a:ext cx="506682" cy="168641"/>
           </a:xfrm>
           <a:prstGeom prst="bentConnector2">
             <a:avLst/>
@@ -5597,7 +5609,7 @@
         </p:nvSpPr>
         <p:spPr>
           <a:xfrm>
-            <a:off x="4394990" y="4110192"/>
+            <a:off x="4962480" y="4094660"/>
             <a:ext cx="1040906" cy="236841"/>
           </a:xfrm>
           <a:prstGeom prst="rect">
@@ -5657,7 +5669,7 @@
         </p:nvSpPr>
         <p:spPr>
           <a:xfrm>
-            <a:off x="4383369" y="4566548"/>
+            <a:off x="4962480" y="4550990"/>
             <a:ext cx="1040906" cy="236841"/>
           </a:xfrm>
           <a:prstGeom prst="rect">
@@ -5719,9 +5731,9 @@
           <p:nvPr/>
         </p:nvCxnSpPr>
         <p:spPr>
-          <a:xfrm>
-            <a:off x="3684434" y="4405088"/>
-            <a:ext cx="698935" cy="279881"/>
+          <a:xfrm flipV="1">
+            <a:off x="4626690" y="4669411"/>
+            <a:ext cx="335790" cy="193860"/>
           </a:xfrm>
           <a:prstGeom prst="bentConnector3">
             <a:avLst>
@@ -5834,6 +5846,339 @@
           </a:p>
         </p:txBody>
       </p:sp>
+      <p:sp>
+        <p:nvSpPr>
+          <p:cNvPr id="58" name="Rectangle 11"/>
+          <p:cNvSpPr/>
+          <p:nvPr/>
+        </p:nvSpPr>
+        <p:spPr>
+          <a:xfrm>
+            <a:off x="3509353" y="4153784"/>
+            <a:ext cx="1093635" cy="236841"/>
+          </a:xfrm>
+          <a:prstGeom prst="rect">
+            <a:avLst/>
+          </a:prstGeom>
+          <a:ln w="19050">
+            <a:solidFill>
+              <a:schemeClr val="accent3"/>
+            </a:solidFill>
+          </a:ln>
+          <a:effectLst/>
+        </p:spPr>
+        <p:style>
+          <a:lnRef idx="1">
+            <a:schemeClr val="accent3"/>
+          </a:lnRef>
+          <a:fillRef idx="2">
+            <a:schemeClr val="accent3"/>
+          </a:fillRef>
+          <a:effectRef idx="1">
+            <a:schemeClr val="accent3"/>
+          </a:effectRef>
+          <a:fontRef idx="minor">
+            <a:schemeClr val="dk1"/>
+          </a:fontRef>
+        </p:style>
+        <p:txBody>
+          <a:bodyPr rtlCol="0" anchor="ctr"/>
+          <a:lstStyle/>
+          <a:p>
+            <a:pPr algn="ctr"/>
+            <a:r>
+              <a:rPr lang="en-US" sz="1050" b="1" dirty="0" err="1" smtClean="0">
+                <a:solidFill>
+                  <a:schemeClr val="accent3">
+                    <a:lumMod val="75000"/>
+                  </a:schemeClr>
+                </a:solidFill>
+              </a:rPr>
+              <a:t>CalendarPanel</a:t>
+            </a:r>
+            <a:endParaRPr lang="en-SG" sz="1050" b="1" dirty="0">
+              <a:solidFill>
+                <a:schemeClr val="accent3">
+                  <a:lumMod val="75000"/>
+                </a:schemeClr>
+              </a:solidFill>
+            </a:endParaRPr>
+          </a:p>
+        </p:txBody>
+      </p:sp>
+      <p:cxnSp>
+        <p:nvCxnSpPr>
+          <p:cNvPr id="59" name="Elbow Connector 63"/>
+          <p:cNvCxnSpPr>
+            <a:stCxn id="60" idx="3"/>
+            <a:endCxn id="58" idx="1"/>
+          </p:cNvCxnSpPr>
+          <p:nvPr/>
+        </p:nvCxnSpPr>
+        <p:spPr>
+          <a:xfrm flipV="1">
+            <a:off x="3054521" y="4272205"/>
+            <a:ext cx="454832" cy="169042"/>
+          </a:xfrm>
+          <a:prstGeom prst="bentConnector3">
+            <a:avLst>
+              <a:gd name="adj1" fmla="val 50000"/>
+            </a:avLst>
+          </a:prstGeom>
+          <a:ln w="19050">
+            <a:solidFill>
+              <a:schemeClr val="accent3"/>
+            </a:solidFill>
+            <a:headEnd type="none" w="med" len="med"/>
+            <a:tailEnd type="arrow" w="med" len="med"/>
+          </a:ln>
+          <a:effectLst/>
+        </p:spPr>
+        <p:style>
+          <a:lnRef idx="1">
+            <a:schemeClr val="accent2"/>
+          </a:lnRef>
+          <a:fillRef idx="2">
+            <a:schemeClr val="accent2"/>
+          </a:fillRef>
+          <a:effectRef idx="1">
+            <a:schemeClr val="accent2"/>
+          </a:effectRef>
+          <a:fontRef idx="minor">
+            <a:schemeClr val="dk1"/>
+          </a:fontRef>
+        </p:style>
+      </p:cxnSp>
+      <p:cxnSp>
+        <p:nvCxnSpPr>
+          <p:cNvPr id="62" name="Elbow Connector 63"/>
+          <p:cNvCxnSpPr>
+            <a:stCxn id="58" idx="3"/>
+            <a:endCxn id="16" idx="3"/>
+          </p:cNvCxnSpPr>
+          <p:nvPr/>
+        </p:nvCxnSpPr>
+        <p:spPr>
+          <a:xfrm flipV="1">
+            <a:off x="4602988" y="2286000"/>
+            <a:ext cx="926981" cy="1986205"/>
+          </a:xfrm>
+          <a:prstGeom prst="bentConnector2">
+            <a:avLst/>
+          </a:prstGeom>
+          <a:ln w="6350">
+            <a:solidFill>
+              <a:schemeClr val="accent3"/>
+            </a:solidFill>
+            <a:headEnd type="none" w="med" len="med"/>
+            <a:tailEnd type="none" w="med" len="med"/>
+          </a:ln>
+          <a:effectLst/>
+        </p:spPr>
+        <p:style>
+          <a:lnRef idx="1">
+            <a:schemeClr val="accent2"/>
+          </a:lnRef>
+          <a:fillRef idx="2">
+            <a:schemeClr val="accent2"/>
+          </a:fillRef>
+          <a:effectRef idx="1">
+            <a:schemeClr val="accent2"/>
+          </a:effectRef>
+          <a:fontRef idx="minor">
+            <a:schemeClr val="dk1"/>
+          </a:fontRef>
+        </p:style>
+      </p:cxnSp>
+      <p:sp>
+        <p:nvSpPr>
+          <p:cNvPr id="60" name="Rectangle 11"/>
+          <p:cNvSpPr/>
+          <p:nvPr/>
+        </p:nvSpPr>
+        <p:spPr>
+          <a:xfrm>
+            <a:off x="1960886" y="4322826"/>
+            <a:ext cx="1093635" cy="236841"/>
+          </a:xfrm>
+          <a:prstGeom prst="rect">
+            <a:avLst/>
+          </a:prstGeom>
+          <a:ln w="19050">
+            <a:solidFill>
+              <a:schemeClr val="accent3"/>
+            </a:solidFill>
+          </a:ln>
+          <a:effectLst/>
+        </p:spPr>
+        <p:style>
+          <a:lnRef idx="1">
+            <a:schemeClr val="accent3"/>
+          </a:lnRef>
+          <a:fillRef idx="2">
+            <a:schemeClr val="accent3"/>
+          </a:fillRef>
+          <a:effectRef idx="1">
+            <a:schemeClr val="accent3"/>
+          </a:effectRef>
+          <a:fontRef idx="minor">
+            <a:schemeClr val="dk1"/>
+          </a:fontRef>
+        </p:style>
+        <p:txBody>
+          <a:bodyPr rtlCol="0" anchor="ctr"/>
+          <a:lstStyle/>
+          <a:p>
+            <a:pPr algn="ctr"/>
+            <a:r>
+              <a:rPr lang="en-US" sz="1050" b="1" dirty="0" err="1" smtClean="0">
+                <a:solidFill>
+                  <a:schemeClr val="accent3">
+                    <a:lumMod val="75000"/>
+                  </a:schemeClr>
+                </a:solidFill>
+              </a:rPr>
+              <a:t>MainView</a:t>
+            </a:r>
+            <a:endParaRPr lang="en-SG" sz="1050" b="1" dirty="0">
+              <a:solidFill>
+                <a:schemeClr val="accent3">
+                  <a:lumMod val="75000"/>
+                </a:schemeClr>
+              </a:solidFill>
+            </a:endParaRPr>
+          </a:p>
+        </p:txBody>
+      </p:sp>
+      <p:cxnSp>
+        <p:nvCxnSpPr>
+          <p:cNvPr id="83" name="Elbow Connector 63"/>
+          <p:cNvCxnSpPr>
+            <a:stCxn id="60" idx="3"/>
+            <a:endCxn id="34" idx="1"/>
+          </p:cNvCxnSpPr>
+          <p:nvPr/>
+        </p:nvCxnSpPr>
+        <p:spPr>
+          <a:xfrm flipV="1">
+            <a:off x="3054521" y="3963955"/>
+            <a:ext cx="459910" cy="477292"/>
+          </a:xfrm>
+          <a:prstGeom prst="bentConnector3">
+            <a:avLst>
+              <a:gd name="adj1" fmla="val 50000"/>
+            </a:avLst>
+          </a:prstGeom>
+          <a:ln w="19050">
+            <a:solidFill>
+              <a:schemeClr val="accent3"/>
+            </a:solidFill>
+            <a:headEnd type="none" w="med" len="med"/>
+            <a:tailEnd type="arrow" w="med" len="med"/>
+          </a:ln>
+          <a:effectLst/>
+        </p:spPr>
+        <p:style>
+          <a:lnRef idx="1">
+            <a:schemeClr val="accent2"/>
+          </a:lnRef>
+          <a:fillRef idx="2">
+            <a:schemeClr val="accent2"/>
+          </a:fillRef>
+          <a:effectRef idx="1">
+            <a:schemeClr val="accent2"/>
+          </a:effectRef>
+          <a:fontRef idx="minor">
+            <a:schemeClr val="dk1"/>
+          </a:fontRef>
+        </p:style>
+      </p:cxnSp>
+      <p:cxnSp>
+        <p:nvCxnSpPr>
+          <p:cNvPr id="106" name="Elbow Connector 63"/>
+          <p:cNvCxnSpPr>
+            <a:endCxn id="89" idx="3"/>
+          </p:cNvCxnSpPr>
+          <p:nvPr/>
+        </p:nvCxnSpPr>
+        <p:spPr>
+          <a:xfrm rot="16200000" flipH="1">
+            <a:off x="4574972" y="3240996"/>
+            <a:ext cx="2383411" cy="473417"/>
+          </a:xfrm>
+          <a:prstGeom prst="bentConnector4">
+            <a:avLst>
+              <a:gd name="adj1" fmla="val 47516"/>
+              <a:gd name="adj2" fmla="val 148287"/>
+            </a:avLst>
+          </a:prstGeom>
+          <a:ln w="6350">
+            <a:solidFill>
+              <a:schemeClr val="accent3"/>
+            </a:solidFill>
+            <a:headEnd type="none" w="med" len="med"/>
+            <a:tailEnd type="none" w="med" len="med"/>
+          </a:ln>
+          <a:effectLst/>
+        </p:spPr>
+        <p:style>
+          <a:lnRef idx="1">
+            <a:schemeClr val="accent2"/>
+          </a:lnRef>
+          <a:fillRef idx="2">
+            <a:schemeClr val="accent2"/>
+          </a:fillRef>
+          <a:effectRef idx="1">
+            <a:schemeClr val="accent2"/>
+          </a:effectRef>
+          <a:fontRef idx="minor">
+            <a:schemeClr val="dk1"/>
+          </a:fontRef>
+        </p:style>
+      </p:cxnSp>
+      <p:cxnSp>
+        <p:nvCxnSpPr>
+          <p:cNvPr id="109" name="Elbow Connector 63"/>
+          <p:cNvCxnSpPr>
+            <a:stCxn id="16" idx="3"/>
+            <a:endCxn id="60" idx="0"/>
+          </p:cNvCxnSpPr>
+          <p:nvPr/>
+        </p:nvCxnSpPr>
+        <p:spPr>
+          <a:xfrm rot="5400000">
+            <a:off x="3000424" y="1793281"/>
+            <a:ext cx="2036826" cy="3022265"/>
+          </a:xfrm>
+          <a:prstGeom prst="bentConnector3">
+            <a:avLst>
+              <a:gd name="adj1" fmla="val 28031"/>
+            </a:avLst>
+          </a:prstGeom>
+          <a:ln w="6350">
+            <a:solidFill>
+              <a:schemeClr val="accent3"/>
+            </a:solidFill>
+            <a:headEnd type="none" w="med" len="med"/>
+            <a:tailEnd type="none" w="med" len="med"/>
+          </a:ln>
+          <a:effectLst/>
+        </p:spPr>
+        <p:style>
+          <a:lnRef idx="1">
+            <a:schemeClr val="accent2"/>
+          </a:lnRef>
+          <a:fillRef idx="2">
+            <a:schemeClr val="accent2"/>
+          </a:fillRef>
+          <a:effectRef idx="1">
+            <a:schemeClr val="accent2"/>
+          </a:effectRef>
+          <a:fontRef idx="minor">
+            <a:schemeClr val="dk1"/>
+          </a:fontRef>
+        </p:style>
+      </p:cxnSp>
     </p:spTree>
     <p:extLst>
       <p:ext uri="{BB962C8B-B14F-4D97-AF65-F5344CB8AC3E}">

</xml_diff>